<commit_message>
IP and HLS test board
</commit_message>
<xml_diff>
--- a/presentation_finale/prensent_A2_forcioli.pptx
+++ b/presentation_finale/prensent_A2_forcioli.pptx
@@ -6708,6 +6708,491 @@
           </a:prstGeom>
         </p:spPr>
       </p:pic>
+      <p:sp>
+        <p:nvSpPr>
+          <p:cNvPr id="5" name="Rectangle : coins arrondis 4">
+            <a:extLst>
+              <a:ext uri="{FF2B5EF4-FFF2-40B4-BE49-F238E27FC236}">
+                <a16:creationId xmlns:a16="http://schemas.microsoft.com/office/drawing/2014/main" id="{D13E28B0-CB36-45BC-B441-4EE32909D922}"/>
+              </a:ext>
+            </a:extLst>
+          </p:cNvPr>
+          <p:cNvSpPr/>
+          <p:nvPr/>
+        </p:nvSpPr>
+        <p:spPr>
+          <a:xfrm>
+            <a:off x="3510119" y="3126236"/>
+            <a:ext cx="1181345" cy="1017639"/>
+          </a:xfrm>
+          <a:prstGeom prst="roundRect">
+            <a:avLst/>
+          </a:prstGeom>
+        </p:spPr>
+        <p:style>
+          <a:lnRef idx="2">
+            <a:schemeClr val="accent1">
+              <a:shade val="50000"/>
+            </a:schemeClr>
+          </a:lnRef>
+          <a:fillRef idx="1">
+            <a:schemeClr val="accent1"/>
+          </a:fillRef>
+          <a:effectRef idx="0">
+            <a:schemeClr val="accent1"/>
+          </a:effectRef>
+          <a:fontRef idx="minor">
+            <a:schemeClr val="lt1"/>
+          </a:fontRef>
+        </p:style>
+        <p:txBody>
+          <a:bodyPr rtlCol="0" anchor="ctr"/>
+          <a:lstStyle/>
+          <a:p>
+            <a:pPr algn="ctr"/>
+            <a:r>
+              <a:rPr lang="fr-FR" dirty="0"/>
+              <a:t>µblaze</a:t>
+            </a:r>
+          </a:p>
+        </p:txBody>
+      </p:sp>
+      <p:sp>
+        <p:nvSpPr>
+          <p:cNvPr id="6" name="Rectangle 5">
+            <a:extLst>
+              <a:ext uri="{FF2B5EF4-FFF2-40B4-BE49-F238E27FC236}">
+                <a16:creationId xmlns:a16="http://schemas.microsoft.com/office/drawing/2014/main" id="{97C39B73-C8CF-4EF7-ABE9-7E306837A316}"/>
+              </a:ext>
+            </a:extLst>
+          </p:cNvPr>
+          <p:cNvSpPr/>
+          <p:nvPr/>
+        </p:nvSpPr>
+        <p:spPr>
+          <a:xfrm>
+            <a:off x="6457695" y="3310596"/>
+            <a:ext cx="2409916" cy="1478301"/>
+          </a:xfrm>
+          <a:prstGeom prst="rect">
+            <a:avLst/>
+          </a:prstGeom>
+        </p:spPr>
+        <p:style>
+          <a:lnRef idx="2">
+            <a:schemeClr val="accent5">
+              <a:shade val="50000"/>
+            </a:schemeClr>
+          </a:lnRef>
+          <a:fillRef idx="1">
+            <a:schemeClr val="accent5"/>
+          </a:fillRef>
+          <a:effectRef idx="0">
+            <a:schemeClr val="accent5"/>
+          </a:effectRef>
+          <a:fontRef idx="minor">
+            <a:schemeClr val="lt1"/>
+          </a:fontRef>
+        </p:style>
+        <p:txBody>
+          <a:bodyPr rtlCol="0" anchor="ctr"/>
+          <a:lstStyle/>
+          <a:p>
+            <a:pPr algn="ctr"/>
+            <a:r>
+              <a:rPr lang="fr-FR" dirty="0" err="1"/>
+              <a:t>Zynq</a:t>
+            </a:r>
+            <a:endParaRPr lang="fr-FR" dirty="0"/>
+          </a:p>
+        </p:txBody>
+      </p:sp>
+      <p:sp>
+        <p:nvSpPr>
+          <p:cNvPr id="7" name="Flèche : droite 6">
+            <a:extLst>
+              <a:ext uri="{FF2B5EF4-FFF2-40B4-BE49-F238E27FC236}">
+                <a16:creationId xmlns:a16="http://schemas.microsoft.com/office/drawing/2014/main" id="{FA35B6C9-6034-4CFA-8EC8-80B13FF04A0D}"/>
+              </a:ext>
+            </a:extLst>
+          </p:cNvPr>
+          <p:cNvSpPr/>
+          <p:nvPr/>
+        </p:nvSpPr>
+        <p:spPr>
+          <a:xfrm>
+            <a:off x="4691464" y="3421488"/>
+            <a:ext cx="970442" cy="361335"/>
+          </a:xfrm>
+          <a:prstGeom prst="rightArrow">
+            <a:avLst/>
+          </a:prstGeom>
+        </p:spPr>
+        <p:style>
+          <a:lnRef idx="2">
+            <a:schemeClr val="accent2">
+              <a:shade val="50000"/>
+            </a:schemeClr>
+          </a:lnRef>
+          <a:fillRef idx="1">
+            <a:schemeClr val="accent2"/>
+          </a:fillRef>
+          <a:effectRef idx="0">
+            <a:schemeClr val="accent2"/>
+          </a:effectRef>
+          <a:fontRef idx="minor">
+            <a:schemeClr val="lt1"/>
+          </a:fontRef>
+        </p:style>
+        <p:txBody>
+          <a:bodyPr rtlCol="0" anchor="ctr"/>
+          <a:lstStyle/>
+          <a:p>
+            <a:pPr algn="ctr"/>
+            <a:r>
+              <a:rPr lang="fr-FR" dirty="0"/>
+              <a:t>IC/DC</a:t>
+            </a:r>
+          </a:p>
+        </p:txBody>
+      </p:sp>
+      <p:sp>
+        <p:nvSpPr>
+          <p:cNvPr id="8" name="Trapèze 7">
+            <a:extLst>
+              <a:ext uri="{FF2B5EF4-FFF2-40B4-BE49-F238E27FC236}">
+                <a16:creationId xmlns:a16="http://schemas.microsoft.com/office/drawing/2014/main" id="{572C1FB1-290E-41F7-8932-ED9F1AF2BF2A}"/>
+              </a:ext>
+            </a:extLst>
+          </p:cNvPr>
+          <p:cNvSpPr/>
+          <p:nvPr/>
+        </p:nvSpPr>
+        <p:spPr>
+          <a:xfrm rot="5400000">
+            <a:off x="5680786" y="3209123"/>
+            <a:ext cx="767751" cy="786066"/>
+          </a:xfrm>
+          <a:prstGeom prst="trapezoid">
+            <a:avLst/>
+          </a:prstGeom>
+        </p:spPr>
+        <p:style>
+          <a:lnRef idx="2">
+            <a:schemeClr val="accent4">
+              <a:shade val="50000"/>
+            </a:schemeClr>
+          </a:lnRef>
+          <a:fillRef idx="1">
+            <a:schemeClr val="accent4"/>
+          </a:fillRef>
+          <a:effectRef idx="0">
+            <a:schemeClr val="accent4"/>
+          </a:effectRef>
+          <a:fontRef idx="minor">
+            <a:schemeClr val="lt1"/>
+          </a:fontRef>
+        </p:style>
+        <p:txBody>
+          <a:bodyPr vert="vert270" rtlCol="0" anchor="ctr"/>
+          <a:lstStyle/>
+          <a:p>
+            <a:pPr algn="ctr"/>
+            <a:r>
+              <a:rPr lang="fr-FR" dirty="0"/>
+              <a:t>HP</a:t>
+            </a:r>
+          </a:p>
+        </p:txBody>
+      </p:sp>
+      <p:sp>
+        <p:nvSpPr>
+          <p:cNvPr id="2" name="Rectangle : avec coins arrondis en diagonale 1">
+            <a:extLst>
+              <a:ext uri="{FF2B5EF4-FFF2-40B4-BE49-F238E27FC236}">
+                <a16:creationId xmlns:a16="http://schemas.microsoft.com/office/drawing/2014/main" id="{5F6B6C9D-97BE-4E3D-8558-FB19A5904F4D}"/>
+              </a:ext>
+            </a:extLst>
+          </p:cNvPr>
+          <p:cNvSpPr/>
+          <p:nvPr/>
+        </p:nvSpPr>
+        <p:spPr>
+          <a:xfrm>
+            <a:off x="212157" y="4099332"/>
+            <a:ext cx="1032387" cy="583475"/>
+          </a:xfrm>
+          <a:prstGeom prst="round2DiagRect">
+            <a:avLst/>
+          </a:prstGeom>
+        </p:spPr>
+        <p:style>
+          <a:lnRef idx="2">
+            <a:schemeClr val="accent3">
+              <a:shade val="50000"/>
+            </a:schemeClr>
+          </a:lnRef>
+          <a:fillRef idx="1">
+            <a:schemeClr val="accent3"/>
+          </a:fillRef>
+          <a:effectRef idx="0">
+            <a:schemeClr val="accent3"/>
+          </a:effectRef>
+          <a:fontRef idx="minor">
+            <a:schemeClr val="lt1"/>
+          </a:fontRef>
+        </p:style>
+        <p:txBody>
+          <a:bodyPr rtlCol="0" anchor="ctr"/>
+          <a:lstStyle/>
+          <a:p>
+            <a:pPr algn="ctr"/>
+            <a:r>
+              <a:rPr lang="fr-FR" dirty="0"/>
+              <a:t>BRAM</a:t>
+            </a:r>
+          </a:p>
+        </p:txBody>
+      </p:sp>
+      <p:sp>
+        <p:nvSpPr>
+          <p:cNvPr id="11" name="Trapèze 10">
+            <a:extLst>
+              <a:ext uri="{FF2B5EF4-FFF2-40B4-BE49-F238E27FC236}">
+                <a16:creationId xmlns:a16="http://schemas.microsoft.com/office/drawing/2014/main" id="{E7B8D379-5AA6-4AE5-8F73-71045FCFAC63}"/>
+              </a:ext>
+            </a:extLst>
+          </p:cNvPr>
+          <p:cNvSpPr/>
+          <p:nvPr/>
+        </p:nvSpPr>
+        <p:spPr>
+          <a:xfrm rot="16200000">
+            <a:off x="1893067" y="3723793"/>
+            <a:ext cx="1278851" cy="674244"/>
+          </a:xfrm>
+          <a:prstGeom prst="trapezoid">
+            <a:avLst/>
+          </a:prstGeom>
+        </p:spPr>
+        <p:style>
+          <a:lnRef idx="2">
+            <a:schemeClr val="accent4">
+              <a:shade val="50000"/>
+            </a:schemeClr>
+          </a:lnRef>
+          <a:fillRef idx="1">
+            <a:schemeClr val="accent4"/>
+          </a:fillRef>
+          <a:effectRef idx="0">
+            <a:schemeClr val="accent4"/>
+          </a:effectRef>
+          <a:fontRef idx="minor">
+            <a:schemeClr val="lt1"/>
+          </a:fontRef>
+        </p:style>
+        <p:txBody>
+          <a:bodyPr vert="vert" rtlCol="0" anchor="ctr"/>
+          <a:lstStyle/>
+          <a:p>
+            <a:pPr algn="ctr"/>
+            <a:r>
+              <a:rPr lang="fr-FR" dirty="0"/>
+              <a:t>AXI</a:t>
+            </a:r>
+          </a:p>
+        </p:txBody>
+      </p:sp>
+      <p:sp>
+        <p:nvSpPr>
+          <p:cNvPr id="12" name="Flèche : droite 11">
+            <a:extLst>
+              <a:ext uri="{FF2B5EF4-FFF2-40B4-BE49-F238E27FC236}">
+                <a16:creationId xmlns:a16="http://schemas.microsoft.com/office/drawing/2014/main" id="{A5D8FEBD-B04E-44B1-80D3-2A8F3329A054}"/>
+              </a:ext>
+            </a:extLst>
+          </p:cNvPr>
+          <p:cNvSpPr/>
+          <p:nvPr/>
+        </p:nvSpPr>
+        <p:spPr>
+          <a:xfrm flipH="1">
+            <a:off x="1282917" y="4216650"/>
+            <a:ext cx="888974" cy="319579"/>
+          </a:xfrm>
+          <a:prstGeom prst="rightArrow">
+            <a:avLst/>
+          </a:prstGeom>
+        </p:spPr>
+        <p:style>
+          <a:lnRef idx="2">
+            <a:schemeClr val="accent2">
+              <a:shade val="50000"/>
+            </a:schemeClr>
+          </a:lnRef>
+          <a:fillRef idx="1">
+            <a:schemeClr val="accent2"/>
+          </a:fillRef>
+          <a:effectRef idx="0">
+            <a:schemeClr val="accent2"/>
+          </a:effectRef>
+          <a:fontRef idx="minor">
+            <a:schemeClr val="lt1"/>
+          </a:fontRef>
+        </p:style>
+        <p:txBody>
+          <a:bodyPr rtlCol="0" anchor="ctr"/>
+          <a:lstStyle/>
+          <a:p>
+            <a:pPr algn="ctr"/>
+            <a:endParaRPr lang="fr-FR" dirty="0"/>
+          </a:p>
+        </p:txBody>
+      </p:sp>
+      <p:sp>
+        <p:nvSpPr>
+          <p:cNvPr id="13" name="Flèche : droite 12">
+            <a:extLst>
+              <a:ext uri="{FF2B5EF4-FFF2-40B4-BE49-F238E27FC236}">
+                <a16:creationId xmlns:a16="http://schemas.microsoft.com/office/drawing/2014/main" id="{33C18776-BBB2-4FD2-84B3-2E3967DB54CF}"/>
+              </a:ext>
+            </a:extLst>
+          </p:cNvPr>
+          <p:cNvSpPr/>
+          <p:nvPr/>
+        </p:nvSpPr>
+        <p:spPr>
+          <a:xfrm flipH="1">
+            <a:off x="2893094" y="4380762"/>
+            <a:ext cx="2878384" cy="319579"/>
+          </a:xfrm>
+          <a:prstGeom prst="rightArrow">
+            <a:avLst/>
+          </a:prstGeom>
+        </p:spPr>
+        <p:style>
+          <a:lnRef idx="2">
+            <a:schemeClr val="accent2">
+              <a:shade val="50000"/>
+            </a:schemeClr>
+          </a:lnRef>
+          <a:fillRef idx="1">
+            <a:schemeClr val="accent2"/>
+          </a:fillRef>
+          <a:effectRef idx="0">
+            <a:schemeClr val="accent2"/>
+          </a:effectRef>
+          <a:fontRef idx="minor">
+            <a:schemeClr val="lt1"/>
+          </a:fontRef>
+        </p:style>
+        <p:txBody>
+          <a:bodyPr rtlCol="0" anchor="ctr"/>
+          <a:lstStyle/>
+          <a:p>
+            <a:pPr algn="ctr"/>
+            <a:endParaRPr lang="fr-FR" dirty="0"/>
+          </a:p>
+        </p:txBody>
+      </p:sp>
+      <p:sp>
+        <p:nvSpPr>
+          <p:cNvPr id="15" name="Trapèze 14">
+            <a:extLst>
+              <a:ext uri="{FF2B5EF4-FFF2-40B4-BE49-F238E27FC236}">
+                <a16:creationId xmlns:a16="http://schemas.microsoft.com/office/drawing/2014/main" id="{C44307B4-59E4-4EBF-9B0D-ED09AF9FE559}"/>
+              </a:ext>
+            </a:extLst>
+          </p:cNvPr>
+          <p:cNvSpPr/>
+          <p:nvPr/>
+        </p:nvSpPr>
+        <p:spPr>
+          <a:xfrm rot="16200000">
+            <a:off x="5762015" y="4108796"/>
+            <a:ext cx="693171" cy="674244"/>
+          </a:xfrm>
+          <a:prstGeom prst="trapezoid">
+            <a:avLst/>
+          </a:prstGeom>
+        </p:spPr>
+        <p:style>
+          <a:lnRef idx="2">
+            <a:schemeClr val="accent4">
+              <a:shade val="50000"/>
+            </a:schemeClr>
+          </a:lnRef>
+          <a:fillRef idx="1">
+            <a:schemeClr val="accent4"/>
+          </a:fillRef>
+          <a:effectRef idx="0">
+            <a:schemeClr val="accent4"/>
+          </a:effectRef>
+          <a:fontRef idx="minor">
+            <a:schemeClr val="lt1"/>
+          </a:fontRef>
+        </p:style>
+        <p:txBody>
+          <a:bodyPr vert="vert" rtlCol="0" anchor="ctr"/>
+          <a:lstStyle/>
+          <a:p>
+            <a:pPr algn="ctr"/>
+            <a:r>
+              <a:rPr lang="fr-FR" dirty="0"/>
+              <a:t>GP</a:t>
+            </a:r>
+          </a:p>
+        </p:txBody>
+      </p:sp>
+      <p:sp>
+        <p:nvSpPr>
+          <p:cNvPr id="16" name="Flèche : droite 15">
+            <a:extLst>
+              <a:ext uri="{FF2B5EF4-FFF2-40B4-BE49-F238E27FC236}">
+                <a16:creationId xmlns:a16="http://schemas.microsoft.com/office/drawing/2014/main" id="{718E7500-233C-428D-9F20-2CBEABE39F0F}"/>
+              </a:ext>
+            </a:extLst>
+          </p:cNvPr>
+          <p:cNvSpPr/>
+          <p:nvPr/>
+        </p:nvSpPr>
+        <p:spPr>
+          <a:xfrm flipH="1">
+            <a:off x="2879337" y="3623033"/>
+            <a:ext cx="621060" cy="319579"/>
+          </a:xfrm>
+          <a:prstGeom prst="rightArrow">
+            <a:avLst/>
+          </a:prstGeom>
+        </p:spPr>
+        <p:style>
+          <a:lnRef idx="2">
+            <a:schemeClr val="accent2">
+              <a:shade val="50000"/>
+            </a:schemeClr>
+          </a:lnRef>
+          <a:fillRef idx="1">
+            <a:schemeClr val="accent2"/>
+          </a:fillRef>
+          <a:effectRef idx="0">
+            <a:schemeClr val="accent2"/>
+          </a:effectRef>
+          <a:fontRef idx="minor">
+            <a:schemeClr val="lt1"/>
+          </a:fontRef>
+        </p:style>
+        <p:txBody>
+          <a:bodyPr rtlCol="0" anchor="ctr"/>
+          <a:lstStyle/>
+          <a:p>
+            <a:pPr algn="ctr"/>
+            <a:r>
+              <a:rPr lang="fr-FR" dirty="0"/>
+              <a:t>DP</a:t>
+            </a:r>
+          </a:p>
+        </p:txBody>
+      </p:sp>
     </p:spTree>
     <p:extLst>
       <p:ext uri="{BB962C8B-B14F-4D97-AF65-F5344CB8AC3E}">
@@ -8242,6 +8727,55 @@
       </p:grpSpPr>
       <p:sp>
         <p:nvSpPr>
+          <p:cNvPr id="17" name="Trapèze 16">
+            <a:extLst>
+              <a:ext uri="{FF2B5EF4-FFF2-40B4-BE49-F238E27FC236}">
+                <a16:creationId xmlns:a16="http://schemas.microsoft.com/office/drawing/2014/main" id="{66BA821D-8065-4783-B879-5A67ADB4CEB3}"/>
+              </a:ext>
+            </a:extLst>
+          </p:cNvPr>
+          <p:cNvSpPr/>
+          <p:nvPr/>
+        </p:nvSpPr>
+        <p:spPr>
+          <a:xfrm rot="5400000">
+            <a:off x="6665080" y="2917563"/>
+            <a:ext cx="767751" cy="786066"/>
+          </a:xfrm>
+          <a:prstGeom prst="trapezoid">
+            <a:avLst/>
+          </a:prstGeom>
+        </p:spPr>
+        <p:style>
+          <a:lnRef idx="2">
+            <a:schemeClr val="accent4">
+              <a:shade val="50000"/>
+            </a:schemeClr>
+          </a:lnRef>
+          <a:fillRef idx="1">
+            <a:schemeClr val="accent4"/>
+          </a:fillRef>
+          <a:effectRef idx="0">
+            <a:schemeClr val="accent4"/>
+          </a:effectRef>
+          <a:fontRef idx="minor">
+            <a:schemeClr val="lt1"/>
+          </a:fontRef>
+        </p:style>
+        <p:txBody>
+          <a:bodyPr vert="vert270" rtlCol="0" anchor="ctr"/>
+          <a:lstStyle/>
+          <a:p>
+            <a:pPr algn="ctr"/>
+            <a:r>
+              <a:rPr lang="fr-FR" dirty="0"/>
+              <a:t>HP</a:t>
+            </a:r>
+          </a:p>
+        </p:txBody>
+      </p:sp>
+      <p:sp>
+        <p:nvSpPr>
           <p:cNvPr id="271" name="CustomShape 1"/>
           <p:cNvSpPr/>
           <p:nvPr/>
@@ -8391,6 +8925,429 @@
             <a:endParaRPr lang="en-US" sz="2800" b="0" strike="noStrike" spc="-1" dirty="0">
               <a:latin typeface="Arial"/>
             </a:endParaRPr>
+          </a:p>
+        </p:txBody>
+      </p:sp>
+      <p:pic>
+        <p:nvPicPr>
+          <p:cNvPr id="2" name="Image 1">
+            <a:extLst>
+              <a:ext uri="{FF2B5EF4-FFF2-40B4-BE49-F238E27FC236}">
+                <a16:creationId xmlns:a16="http://schemas.microsoft.com/office/drawing/2014/main" id="{F24CF4E2-A8D6-49E3-8214-1E9D17E1CEB6}"/>
+              </a:ext>
+            </a:extLst>
+          </p:cNvPr>
+          <p:cNvPicPr>
+            <a:picLocks noChangeAspect="1"/>
+          </p:cNvPicPr>
+          <p:nvPr/>
+        </p:nvPicPr>
+        <p:blipFill>
+          <a:blip r:embed="rId2"/>
+          <a:stretch>
+            <a:fillRect/>
+          </a:stretch>
+        </p:blipFill>
+        <p:spPr>
+          <a:xfrm>
+            <a:off x="4704736" y="366884"/>
+            <a:ext cx="4762283" cy="2559836"/>
+          </a:xfrm>
+          <a:prstGeom prst="rect">
+            <a:avLst/>
+          </a:prstGeom>
+        </p:spPr>
+      </p:pic>
+      <p:sp>
+        <p:nvSpPr>
+          <p:cNvPr id="3" name="Rectangle : coins arrondis 2">
+            <a:extLst>
+              <a:ext uri="{FF2B5EF4-FFF2-40B4-BE49-F238E27FC236}">
+                <a16:creationId xmlns:a16="http://schemas.microsoft.com/office/drawing/2014/main" id="{6646064C-2B28-404F-AAA2-BF0C2FBD6DFE}"/>
+              </a:ext>
+            </a:extLst>
+          </p:cNvPr>
+          <p:cNvSpPr/>
+          <p:nvPr/>
+        </p:nvSpPr>
+        <p:spPr>
+          <a:xfrm>
+            <a:off x="4054333" y="3097160"/>
+            <a:ext cx="1181345" cy="1017639"/>
+          </a:xfrm>
+          <a:prstGeom prst="roundRect">
+            <a:avLst/>
+          </a:prstGeom>
+        </p:spPr>
+        <p:style>
+          <a:lnRef idx="2">
+            <a:schemeClr val="accent1">
+              <a:shade val="50000"/>
+            </a:schemeClr>
+          </a:lnRef>
+          <a:fillRef idx="1">
+            <a:schemeClr val="accent1"/>
+          </a:fillRef>
+          <a:effectRef idx="0">
+            <a:schemeClr val="accent1"/>
+          </a:effectRef>
+          <a:fontRef idx="minor">
+            <a:schemeClr val="lt1"/>
+          </a:fontRef>
+        </p:style>
+        <p:txBody>
+          <a:bodyPr rtlCol="0" anchor="ctr"/>
+          <a:lstStyle/>
+          <a:p>
+            <a:pPr algn="ctr"/>
+            <a:r>
+              <a:rPr lang="fr-FR" dirty="0"/>
+              <a:t>µblaze</a:t>
+            </a:r>
+          </a:p>
+        </p:txBody>
+      </p:sp>
+      <p:sp>
+        <p:nvSpPr>
+          <p:cNvPr id="4" name="Flèche : droite 3">
+            <a:extLst>
+              <a:ext uri="{FF2B5EF4-FFF2-40B4-BE49-F238E27FC236}">
+                <a16:creationId xmlns:a16="http://schemas.microsoft.com/office/drawing/2014/main" id="{C239BB2B-55E9-42B2-AE5F-17A825F72201}"/>
+              </a:ext>
+            </a:extLst>
+          </p:cNvPr>
+          <p:cNvSpPr/>
+          <p:nvPr/>
+        </p:nvSpPr>
+        <p:spPr>
+          <a:xfrm>
+            <a:off x="5253378" y="3171361"/>
+            <a:ext cx="1420244" cy="361335"/>
+          </a:xfrm>
+          <a:prstGeom prst="rightArrow">
+            <a:avLst/>
+          </a:prstGeom>
+        </p:spPr>
+        <p:style>
+          <a:lnRef idx="2">
+            <a:schemeClr val="accent2">
+              <a:shade val="50000"/>
+            </a:schemeClr>
+          </a:lnRef>
+          <a:fillRef idx="1">
+            <a:schemeClr val="accent2"/>
+          </a:fillRef>
+          <a:effectRef idx="0">
+            <a:schemeClr val="accent2"/>
+          </a:effectRef>
+          <a:fontRef idx="minor">
+            <a:schemeClr val="lt1"/>
+          </a:fontRef>
+        </p:style>
+        <p:txBody>
+          <a:bodyPr rtlCol="0" anchor="ctr"/>
+          <a:lstStyle/>
+          <a:p>
+            <a:pPr algn="ctr"/>
+            <a:r>
+              <a:rPr lang="fr-FR" dirty="0"/>
+              <a:t>IC</a:t>
+            </a:r>
+          </a:p>
+        </p:txBody>
+      </p:sp>
+      <p:sp>
+        <p:nvSpPr>
+          <p:cNvPr id="5" name="Ellipse 4">
+            <a:extLst>
+              <a:ext uri="{FF2B5EF4-FFF2-40B4-BE49-F238E27FC236}">
+                <a16:creationId xmlns:a16="http://schemas.microsoft.com/office/drawing/2014/main" id="{A662C9C0-6CCC-4DD3-8DB9-21740246613E}"/>
+              </a:ext>
+            </a:extLst>
+          </p:cNvPr>
+          <p:cNvSpPr/>
+          <p:nvPr/>
+        </p:nvSpPr>
+        <p:spPr>
+          <a:xfrm>
+            <a:off x="4246794" y="4358099"/>
+            <a:ext cx="899652" cy="523568"/>
+          </a:xfrm>
+          <a:prstGeom prst="ellipse">
+            <a:avLst/>
+          </a:prstGeom>
+        </p:spPr>
+        <p:style>
+          <a:lnRef idx="2">
+            <a:schemeClr val="accent3">
+              <a:shade val="50000"/>
+            </a:schemeClr>
+          </a:lnRef>
+          <a:fillRef idx="1">
+            <a:schemeClr val="accent3"/>
+          </a:fillRef>
+          <a:effectRef idx="0">
+            <a:schemeClr val="accent3"/>
+          </a:effectRef>
+          <a:fontRef idx="minor">
+            <a:schemeClr val="lt1"/>
+          </a:fontRef>
+        </p:style>
+        <p:txBody>
+          <a:bodyPr rtlCol="0" anchor="ctr"/>
+          <a:lstStyle/>
+          <a:p>
+            <a:pPr algn="ctr"/>
+            <a:r>
+              <a:rPr lang="fr-FR" dirty="0"/>
+              <a:t>HLS</a:t>
+            </a:r>
+          </a:p>
+        </p:txBody>
+      </p:sp>
+      <p:sp>
+        <p:nvSpPr>
+          <p:cNvPr id="6" name="Flèche : bas 5">
+            <a:extLst>
+              <a:ext uri="{FF2B5EF4-FFF2-40B4-BE49-F238E27FC236}">
+                <a16:creationId xmlns:a16="http://schemas.microsoft.com/office/drawing/2014/main" id="{BA0A82FA-738F-4E89-A959-5DD59C0BAAA6}"/>
+              </a:ext>
+            </a:extLst>
+          </p:cNvPr>
+          <p:cNvSpPr/>
+          <p:nvPr/>
+        </p:nvSpPr>
+        <p:spPr>
+          <a:xfrm>
+            <a:off x="4156095" y="3939245"/>
+            <a:ext cx="1097282" cy="410101"/>
+          </a:xfrm>
+          <a:prstGeom prst="downArrow">
+            <a:avLst/>
+          </a:prstGeom>
+        </p:spPr>
+        <p:style>
+          <a:lnRef idx="2">
+            <a:schemeClr val="accent6">
+              <a:shade val="50000"/>
+            </a:schemeClr>
+          </a:lnRef>
+          <a:fillRef idx="1">
+            <a:schemeClr val="accent6"/>
+          </a:fillRef>
+          <a:effectRef idx="0">
+            <a:schemeClr val="accent6"/>
+          </a:effectRef>
+          <a:fontRef idx="minor">
+            <a:schemeClr val="lt1"/>
+          </a:fontRef>
+        </p:style>
+        <p:txBody>
+          <a:bodyPr rtlCol="0" anchor="ctr"/>
+          <a:lstStyle/>
+          <a:p>
+            <a:pPr algn="ctr"/>
+            <a:r>
+              <a:rPr lang="fr-FR" dirty="0"/>
+              <a:t>DP</a:t>
+            </a:r>
+          </a:p>
+        </p:txBody>
+      </p:sp>
+      <p:sp>
+        <p:nvSpPr>
+          <p:cNvPr id="7" name="Trapèze 6">
+            <a:extLst>
+              <a:ext uri="{FF2B5EF4-FFF2-40B4-BE49-F238E27FC236}">
+                <a16:creationId xmlns:a16="http://schemas.microsoft.com/office/drawing/2014/main" id="{F9413969-1506-4E24-8E1A-35157C6D875C}"/>
+              </a:ext>
+            </a:extLst>
+          </p:cNvPr>
+          <p:cNvSpPr/>
+          <p:nvPr/>
+        </p:nvSpPr>
+        <p:spPr>
+          <a:xfrm rot="5400000">
+            <a:off x="6396466" y="4001860"/>
+            <a:ext cx="1297655" cy="786066"/>
+          </a:xfrm>
+          <a:prstGeom prst="trapezoid">
+            <a:avLst/>
+          </a:prstGeom>
+        </p:spPr>
+        <p:style>
+          <a:lnRef idx="2">
+            <a:schemeClr val="accent4">
+              <a:shade val="50000"/>
+            </a:schemeClr>
+          </a:lnRef>
+          <a:fillRef idx="1">
+            <a:schemeClr val="accent4"/>
+          </a:fillRef>
+          <a:effectRef idx="0">
+            <a:schemeClr val="accent4"/>
+          </a:effectRef>
+          <a:fontRef idx="minor">
+            <a:schemeClr val="lt1"/>
+          </a:fontRef>
+        </p:style>
+        <p:txBody>
+          <a:bodyPr vert="vert270" rtlCol="0" anchor="ctr"/>
+          <a:lstStyle/>
+          <a:p>
+            <a:pPr algn="ctr"/>
+            <a:r>
+              <a:rPr lang="fr-FR" dirty="0"/>
+              <a:t>AC</a:t>
+            </a:r>
+          </a:p>
+        </p:txBody>
+      </p:sp>
+      <p:sp>
+        <p:nvSpPr>
+          <p:cNvPr id="13" name="Flèche : droite 12">
+            <a:extLst>
+              <a:ext uri="{FF2B5EF4-FFF2-40B4-BE49-F238E27FC236}">
+                <a16:creationId xmlns:a16="http://schemas.microsoft.com/office/drawing/2014/main" id="{381B20B0-EC82-4F33-994E-8A5ED9EC6683}"/>
+              </a:ext>
+            </a:extLst>
+          </p:cNvPr>
+          <p:cNvSpPr/>
+          <p:nvPr/>
+        </p:nvSpPr>
+        <p:spPr>
+          <a:xfrm>
+            <a:off x="5258115" y="3753510"/>
+            <a:ext cx="1402546" cy="390785"/>
+          </a:xfrm>
+          <a:prstGeom prst="rightArrow">
+            <a:avLst/>
+          </a:prstGeom>
+        </p:spPr>
+        <p:style>
+          <a:lnRef idx="2">
+            <a:schemeClr val="accent2">
+              <a:shade val="50000"/>
+            </a:schemeClr>
+          </a:lnRef>
+          <a:fillRef idx="1">
+            <a:schemeClr val="accent2"/>
+          </a:fillRef>
+          <a:effectRef idx="0">
+            <a:schemeClr val="accent2"/>
+          </a:effectRef>
+          <a:fontRef idx="minor">
+            <a:schemeClr val="lt1"/>
+          </a:fontRef>
+        </p:style>
+        <p:txBody>
+          <a:bodyPr rtlCol="0" anchor="ctr"/>
+          <a:lstStyle/>
+          <a:p>
+            <a:pPr algn="ctr"/>
+            <a:r>
+              <a:rPr lang="fr-FR" dirty="0"/>
+              <a:t>DC</a:t>
+            </a:r>
+          </a:p>
+        </p:txBody>
+      </p:sp>
+      <p:sp>
+        <p:nvSpPr>
+          <p:cNvPr id="14" name="Flèche : droite 13">
+            <a:extLst>
+              <a:ext uri="{FF2B5EF4-FFF2-40B4-BE49-F238E27FC236}">
+                <a16:creationId xmlns:a16="http://schemas.microsoft.com/office/drawing/2014/main" id="{EEDD1FA8-7BC6-4DDC-8304-AB5AFDD0BE5F}"/>
+              </a:ext>
+            </a:extLst>
+          </p:cNvPr>
+          <p:cNvSpPr/>
+          <p:nvPr/>
+        </p:nvSpPr>
+        <p:spPr>
+          <a:xfrm>
+            <a:off x="5093753" y="4418412"/>
+            <a:ext cx="1562170" cy="447140"/>
+          </a:xfrm>
+          <a:prstGeom prst="rightArrow">
+            <a:avLst/>
+          </a:prstGeom>
+        </p:spPr>
+        <p:style>
+          <a:lnRef idx="2">
+            <a:schemeClr val="accent2">
+              <a:shade val="50000"/>
+            </a:schemeClr>
+          </a:lnRef>
+          <a:fillRef idx="1">
+            <a:schemeClr val="accent2"/>
+          </a:fillRef>
+          <a:effectRef idx="0">
+            <a:schemeClr val="accent2"/>
+          </a:effectRef>
+          <a:fontRef idx="minor">
+            <a:schemeClr val="lt1"/>
+          </a:fontRef>
+        </p:style>
+        <p:txBody>
+          <a:bodyPr rtlCol="0" anchor="ctr"/>
+          <a:lstStyle/>
+          <a:p>
+            <a:pPr algn="ctr"/>
+            <a:r>
+              <a:rPr lang="fr-FR" dirty="0"/>
+              <a:t>In/out</a:t>
+            </a:r>
+          </a:p>
+        </p:txBody>
+      </p:sp>
+      <p:sp>
+        <p:nvSpPr>
+          <p:cNvPr id="11" name="Rectangle 10">
+            <a:extLst>
+              <a:ext uri="{FF2B5EF4-FFF2-40B4-BE49-F238E27FC236}">
+                <a16:creationId xmlns:a16="http://schemas.microsoft.com/office/drawing/2014/main" id="{F348A921-547B-4195-B567-D55BD016D811}"/>
+              </a:ext>
+            </a:extLst>
+          </p:cNvPr>
+          <p:cNvSpPr/>
+          <p:nvPr/>
+        </p:nvSpPr>
+        <p:spPr>
+          <a:xfrm>
+            <a:off x="7439402" y="3039461"/>
+            <a:ext cx="2409916" cy="1923371"/>
+          </a:xfrm>
+          <a:prstGeom prst="rect">
+            <a:avLst/>
+          </a:prstGeom>
+        </p:spPr>
+        <p:style>
+          <a:lnRef idx="2">
+            <a:schemeClr val="accent5">
+              <a:shade val="50000"/>
+            </a:schemeClr>
+          </a:lnRef>
+          <a:fillRef idx="1">
+            <a:schemeClr val="accent5"/>
+          </a:fillRef>
+          <a:effectRef idx="0">
+            <a:schemeClr val="accent5"/>
+          </a:effectRef>
+          <a:fontRef idx="minor">
+            <a:schemeClr val="lt1"/>
+          </a:fontRef>
+        </p:style>
+        <p:txBody>
+          <a:bodyPr rtlCol="0" anchor="ctr"/>
+          <a:lstStyle/>
+          <a:p>
+            <a:pPr algn="ctr"/>
+            <a:r>
+              <a:rPr lang="fr-FR" dirty="0" err="1"/>
+              <a:t>Zynq</a:t>
+            </a:r>
+            <a:endParaRPr lang="fr-FR" dirty="0"/>
           </a:p>
         </p:txBody>
       </p:sp>

</xml_diff>